<commit_message>
Uppdaterade slutrapporten med kodkritik, profiling och granskningsupplevelser
</commit_message>
<xml_diff>
--- a/reports/Slutredovisning/slutredovisning_grupp2.pptx
+++ b/reports/Slutredovisning/slutredovisning_grupp2.pptx
@@ -6,7 +6,7 @@
     <p:sldMasterId id="2147483661" r:id="rId2"/>
   </p:sldMasterIdLst>
   <p:notesMasterIdLst>
-    <p:notesMasterId r:id="rId36"/>
+    <p:notesMasterId r:id="rId37"/>
   </p:notesMasterIdLst>
   <p:sldIdLst>
     <p:sldId id="256" r:id="rId3"/>
@@ -35,13 +35,14 @@
     <p:sldId id="273" r:id="rId26"/>
     <p:sldId id="294" r:id="rId27"/>
     <p:sldId id="274" r:id="rId28"/>
-    <p:sldId id="275" r:id="rId29"/>
+    <p:sldId id="297" r:id="rId29"/>
     <p:sldId id="276" r:id="rId30"/>
-    <p:sldId id="277" r:id="rId31"/>
-    <p:sldId id="278" r:id="rId32"/>
-    <p:sldId id="279" r:id="rId33"/>
-    <p:sldId id="280" r:id="rId34"/>
-    <p:sldId id="281" r:id="rId35"/>
+    <p:sldId id="295" r:id="rId31"/>
+    <p:sldId id="277" r:id="rId32"/>
+    <p:sldId id="278" r:id="rId33"/>
+    <p:sldId id="296" r:id="rId34"/>
+    <p:sldId id="280" r:id="rId35"/>
+    <p:sldId id="281" r:id="rId36"/>
   </p:sldIdLst>
   <p:sldSz cx="12192000" cy="6858000"/>
   <p:notesSz cx="6858000" cy="9144000"/>
@@ -13776,7 +13777,7 @@
       </p:grpSpPr>
       <p:sp>
         <p:nvSpPr>
-          <p:cNvPr id="182" name="PlaceHolder 1"/>
+          <p:cNvPr id="121" name="PlaceHolder 1"/>
           <p:cNvSpPr>
             <a:spLocks noGrp="1"/>
           </p:cNvSpPr>
@@ -13787,23 +13788,23 @@
         <p:spPr>
           <a:xfrm>
             <a:off x="685800" y="4400640"/>
-            <a:ext cx="5486040" cy="3600000"/>
+            <a:ext cx="5485680" cy="3599640"/>
           </a:xfrm>
           <a:prstGeom prst="rect">
             <a:avLst/>
           </a:prstGeom>
         </p:spPr>
         <p:txBody>
-          <a:bodyPr/>
+          <a:bodyPr lIns="0" tIns="0" rIns="0" bIns="0"/>
           <a:lstStyle/>
           <a:p>
-            <a:pPr>
+            <a:pPr marL="216000" indent="-216000">
               <a:lnSpc>
                 <a:spcPct val="100000"/>
               </a:lnSpc>
             </a:pPr>
             <a:r>
-              <a:rPr lang="en-US" sz="1200" strike="noStrike" spc="-1">
+              <a:rPr lang="sv-SE" sz="1200" b="0" strike="noStrike" spc="-1">
                 <a:solidFill>
                   <a:srgbClr val="000000"/>
                 </a:solidFill>
@@ -13817,28 +13818,48 @@
               </a:rPr>
               <a:t>En diskussion om vilka era erfarenheter ni dragit av att tillämpa granskning. Det finns inget rätt eller fel här. Enda sättet att bli underkända är att bara fuska över punkten och bara säga något pliktskyldigt. Ni förväntas förhålla er till såväl kursböckerna som utdelat material och IEEE Std 1028.</a:t>
             </a:r>
-            <a:endParaRPr/>
-          </a:p>
-          <a:p>
-            <a:pPr>
+            <a:endParaRPr lang="sv-SE" sz="2000" b="0" strike="noStrike" spc="-1">
+              <a:solidFill>
+                <a:srgbClr val="000000"/>
+              </a:solidFill>
+              <a:uFill>
+                <a:solidFill>
+                  <a:srgbClr val="FFFFFF"/>
+                </a:solidFill>
+              </a:uFill>
+              <a:latin typeface="Arial"/>
+            </a:endParaRPr>
+          </a:p>
+          <a:p>
+            <a:pPr marL="216000" indent="-216000">
               <a:lnSpc>
                 <a:spcPct val="100000"/>
               </a:lnSpc>
             </a:pPr>
-            <a:endParaRPr/>
+            <a:endParaRPr lang="sv-SE" sz="2000" b="0" strike="noStrike" spc="-1">
+              <a:solidFill>
+                <a:srgbClr val="000000"/>
+              </a:solidFill>
+              <a:uFill>
+                <a:solidFill>
+                  <a:srgbClr val="FFFFFF"/>
+                </a:solidFill>
+              </a:uFill>
+              <a:latin typeface="Arial"/>
+            </a:endParaRPr>
           </a:p>
         </p:txBody>
       </p:sp>
       <p:sp>
         <p:nvSpPr>
-          <p:cNvPr id="183" name="TextShape 2"/>
-          <p:cNvSpPr txBox="1"/>
+          <p:cNvPr id="122" name="CustomShape 2"/>
+          <p:cNvSpPr/>
           <p:nvPr/>
         </p:nvSpPr>
         <p:spPr>
           <a:xfrm>
             <a:off x="3884760" y="8685360"/>
-            <a:ext cx="2971440" cy="458280"/>
+            <a:ext cx="2971080" cy="457920"/>
           </a:xfrm>
           <a:prstGeom prst="rect">
             <a:avLst/>
@@ -13848,8 +13869,20 @@
             <a:noFill/>
           </a:ln>
         </p:spPr>
+        <p:style>
+          <a:lnRef idx="0">
+            <a:scrgbClr r="0" g="0" b="0"/>
+          </a:lnRef>
+          <a:fillRef idx="0">
+            <a:scrgbClr r="0" g="0" b="0"/>
+          </a:fillRef>
+          <a:effectRef idx="0">
+            <a:scrgbClr r="0" g="0" b="0"/>
+          </a:effectRef>
+          <a:fontRef idx="minor"/>
+        </p:style>
         <p:txBody>
-          <a:bodyPr anchor="b"/>
+          <a:bodyPr lIns="90000" tIns="45000" rIns="90000" bIns="45000" anchor="b"/>
           <a:lstStyle/>
           <a:p>
             <a:pPr algn="r">
@@ -13857,8 +13890,8 @@
                 <a:spcPct val="100000"/>
               </a:lnSpc>
             </a:pPr>
-            <a:fld id="{ED33B339-0E7A-41D1-85ED-5AB902D6B4AB}" type="slidenum">
-              <a:rPr lang="en-US" sz="1200" strike="noStrike" spc="-1">
+            <a:fld id="{32DDE81E-9268-41F0-A629-C8EFFDC37864}" type="slidenum">
+              <a:rPr lang="sv-SE" sz="1200" b="0" strike="noStrike" spc="-1">
                 <a:solidFill>
                   <a:srgbClr val="000000"/>
                 </a:solidFill>
@@ -13872,14 +13905,24 @@
               </a:rPr>
               <a:t>27</a:t>
             </a:fld>
-            <a:endParaRPr/>
+            <a:endParaRPr lang="sv-SE" sz="1800" b="0" strike="noStrike" spc="-1">
+              <a:solidFill>
+                <a:srgbClr val="000000"/>
+              </a:solidFill>
+              <a:uFill>
+                <a:solidFill>
+                  <a:srgbClr val="FFFFFF"/>
+                </a:solidFill>
+              </a:uFill>
+              <a:latin typeface="Arial"/>
+            </a:endParaRPr>
           </a:p>
         </p:txBody>
       </p:sp>
     </p:spTree>
     <p:extLst>
       <p:ext uri="{BB962C8B-B14F-4D97-AF65-F5344CB8AC3E}">
-        <p14:creationId xmlns:p14="http://schemas.microsoft.com/office/powerpoint/2010/main" val="3070106970"/>
+        <p14:creationId xmlns:p14="http://schemas.microsoft.com/office/powerpoint/2010/main" val="3673400916"/>
       </p:ext>
     </p:extLst>
   </p:cSld>
@@ -15859,7 +15902,7 @@
                 <a:latin typeface="+mn-lt"/>
                 <a:ea typeface="+mn-ea"/>
               </a:rPr>
-              <a:t>29</a:t>
+              <a:t>30</a:t>
             </a:fld>
             <a:endParaRPr/>
           </a:p>
@@ -18497,7 +18540,7 @@
                 <a:latin typeface="+mn-lt"/>
                 <a:ea typeface="+mn-ea"/>
               </a:rPr>
-              <a:t>30</a:t>
+              <a:t>31</a:t>
             </a:fld>
             <a:endParaRPr/>
           </a:p>
@@ -18535,7 +18578,7 @@
       </p:grpSpPr>
       <p:sp>
         <p:nvSpPr>
-          <p:cNvPr id="190" name="PlaceHolder 1"/>
+          <p:cNvPr id="124" name="PlaceHolder 1"/>
           <p:cNvSpPr>
             <a:spLocks noGrp="1"/>
           </p:cNvSpPr>
@@ -18546,23 +18589,23 @@
         <p:spPr>
           <a:xfrm>
             <a:off x="685800" y="4400640"/>
-            <a:ext cx="5486040" cy="3600000"/>
+            <a:ext cx="5485680" cy="3599640"/>
           </a:xfrm>
           <a:prstGeom prst="rect">
             <a:avLst/>
           </a:prstGeom>
         </p:spPr>
         <p:txBody>
-          <a:bodyPr/>
+          <a:bodyPr lIns="0" tIns="0" rIns="0" bIns="0"/>
           <a:lstStyle/>
           <a:p>
-            <a:pPr>
+            <a:pPr marL="216000" indent="-216000">
               <a:lnSpc>
                 <a:spcPct val="100000"/>
               </a:lnSpc>
             </a:pPr>
             <a:r>
-              <a:rPr lang="en-US" sz="1200" strike="noStrike" spc="-1">
+              <a:rPr lang="sv-SE" sz="1200" b="0" strike="noStrike" spc="-1">
                 <a:solidFill>
                   <a:srgbClr val="000000"/>
                 </a:solidFill>
@@ -18576,36 +18619,66 @@
               </a:rPr>
               <a:t>En kort presentation av hur ni gått tillväga för att testa koden med en profiler och vilka resultat ni fick fram. Även här är det viktigt att förhållas sig till måtten, inte bara presentera dem.</a:t>
             </a:r>
-            <a:endParaRPr/>
-          </a:p>
-          <a:p>
-            <a:pPr>
+            <a:endParaRPr lang="sv-SE" sz="2000" b="0" strike="noStrike" spc="-1">
+              <a:solidFill>
+                <a:srgbClr val="000000"/>
+              </a:solidFill>
+              <a:uFill>
+                <a:solidFill>
+                  <a:srgbClr val="FFFFFF"/>
+                </a:solidFill>
+              </a:uFill>
+              <a:latin typeface="Arial"/>
+            </a:endParaRPr>
+          </a:p>
+          <a:p>
+            <a:pPr marL="216000" indent="-216000">
               <a:lnSpc>
                 <a:spcPct val="100000"/>
               </a:lnSpc>
             </a:pPr>
-            <a:endParaRPr/>
-          </a:p>
-          <a:p>
-            <a:pPr>
+            <a:endParaRPr lang="sv-SE" sz="2000" b="0" strike="noStrike" spc="-1">
+              <a:solidFill>
+                <a:srgbClr val="000000"/>
+              </a:solidFill>
+              <a:uFill>
+                <a:solidFill>
+                  <a:srgbClr val="FFFFFF"/>
+                </a:solidFill>
+              </a:uFill>
+              <a:latin typeface="Arial"/>
+            </a:endParaRPr>
+          </a:p>
+          <a:p>
+            <a:pPr marL="216000" indent="-216000">
               <a:lnSpc>
                 <a:spcPct val="100000"/>
               </a:lnSpc>
             </a:pPr>
-            <a:endParaRPr/>
+            <a:endParaRPr lang="sv-SE" sz="2000" b="0" strike="noStrike" spc="-1">
+              <a:solidFill>
+                <a:srgbClr val="000000"/>
+              </a:solidFill>
+              <a:uFill>
+                <a:solidFill>
+                  <a:srgbClr val="FFFFFF"/>
+                </a:solidFill>
+              </a:uFill>
+              <a:latin typeface="Arial"/>
+            </a:endParaRPr>
           </a:p>
         </p:txBody>
       </p:sp>
       <p:sp>
         <p:nvSpPr>
-          <p:cNvPr id="191" name="TextShape 2"/>
-          <p:cNvSpPr txBox="1"/>
+          <p:cNvPr id="125" name="CustomShape 2"/>
+          <p:cNvSpPr/>
           <p:nvPr/>
         </p:nvSpPr>
         <p:spPr>
           <a:xfrm>
             <a:off x="3884760" y="8685360"/>
-            <a:ext cx="2971440" cy="458280"/>
+            <a:ext cx="2971080" cy="457920"/>
           </a:xfrm>
           <a:prstGeom prst="rect">
             <a:avLst/>
@@ -18615,8 +18688,20 @@
             <a:noFill/>
           </a:ln>
         </p:spPr>
+        <p:style>
+          <a:lnRef idx="0">
+            <a:scrgbClr r="0" g="0" b="0"/>
+          </a:lnRef>
+          <a:fillRef idx="0">
+            <a:scrgbClr r="0" g="0" b="0"/>
+          </a:fillRef>
+          <a:effectRef idx="0">
+            <a:scrgbClr r="0" g="0" b="0"/>
+          </a:effectRef>
+          <a:fontRef idx="minor"/>
+        </p:style>
         <p:txBody>
-          <a:bodyPr anchor="b"/>
+          <a:bodyPr lIns="90000" tIns="45000" rIns="90000" bIns="45000" anchor="b"/>
           <a:lstStyle/>
           <a:p>
             <a:pPr algn="r">
@@ -18624,29 +18709,39 @@
                 <a:spcPct val="100000"/>
               </a:lnSpc>
             </a:pPr>
-            <a:fld id="{4159B4C9-E4FC-4936-9DFF-D3D96360B975}" type="slidenum">
-              <a:rPr lang="en-US" sz="1200" strike="noStrike" spc="-1">
-                <a:solidFill>
-                  <a:srgbClr val="000000"/>
-                </a:solidFill>
-                <a:uFill>
-                  <a:solidFill>
-                    <a:srgbClr val="FFFFFF"/>
-                  </a:solidFill>
-                </a:uFill>
-                <a:latin typeface="+mn-lt"/>
-                <a:ea typeface="+mn-ea"/>
-              </a:rPr>
-              <a:t>31</a:t>
+            <a:fld id="{E788D618-8660-4DBD-8922-B156055AAFA7}" type="slidenum">
+              <a:rPr lang="sv-SE" sz="1200" b="0" strike="noStrike" spc="-1">
+                <a:solidFill>
+                  <a:srgbClr val="000000"/>
+                </a:solidFill>
+                <a:uFill>
+                  <a:solidFill>
+                    <a:srgbClr val="FFFFFF"/>
+                  </a:solidFill>
+                </a:uFill>
+                <a:latin typeface="+mn-lt"/>
+                <a:ea typeface="+mn-ea"/>
+              </a:rPr>
+              <a:t>32</a:t>
             </a:fld>
-            <a:endParaRPr/>
+            <a:endParaRPr lang="sv-SE" sz="1800" b="0" strike="noStrike" spc="-1">
+              <a:solidFill>
+                <a:srgbClr val="000000"/>
+              </a:solidFill>
+              <a:uFill>
+                <a:solidFill>
+                  <a:srgbClr val="FFFFFF"/>
+                </a:solidFill>
+              </a:uFill>
+              <a:latin typeface="Arial"/>
+            </a:endParaRPr>
           </a:p>
         </p:txBody>
       </p:sp>
     </p:spTree>
     <p:extLst>
       <p:ext uri="{BB962C8B-B14F-4D97-AF65-F5344CB8AC3E}">
-        <p14:creationId xmlns:p14="http://schemas.microsoft.com/office/powerpoint/2010/main" val="3050372286"/>
+        <p14:creationId xmlns:p14="http://schemas.microsoft.com/office/powerpoint/2010/main" val="3372960860"/>
       </p:ext>
     </p:extLst>
   </p:cSld>
@@ -18769,7 +18864,7 @@
                 <a:latin typeface="+mn-lt"/>
                 <a:ea typeface="+mn-ea"/>
               </a:rPr>
-              <a:t>32</a:t>
+              <a:t>33</a:t>
             </a:fld>
             <a:endParaRPr/>
           </a:p>
@@ -18901,7 +18996,7 @@
                 <a:latin typeface="+mn-lt"/>
                 <a:ea typeface="+mn-ea"/>
               </a:rPr>
-              <a:t>33</a:t>
+              <a:t>34</a:t>
             </a:fld>
             <a:endParaRPr/>
           </a:p>
@@ -27841,7 +27936,7 @@
           <a:p>
             <a:fld id="{B4C653A3-D7FF-4AF7-943B-34A467C3139E}" type="datetimeFigureOut">
               <a:rPr lang="sv-SE" smtClean="0"/>
-              <a:t>2016-10-26</a:t>
+              <a:t>2016-10-27</a:t>
             </a:fld>
             <a:endParaRPr lang="sv-SE"/>
           </a:p>
@@ -34918,7 +35013,6 @@
               <a:rPr lang="sv-SE" dirty="0" smtClean="0"/>
               <a:t>resultat, alltså de olika output som genereras utifrån de olika kombinationer av flaggor och sökvägar som kan anges. I och med att vi vill testa dessa olika kombinationer anser vi att beslutstabeller är en bra teknik för att få fram bra testfall för detta.</a:t>
             </a:r>
-            <a:endParaRPr lang="sv-SE" dirty="0" smtClean="0"/>
           </a:p>
         </p:txBody>
       </p:sp>
@@ -35541,54 +35635,6 @@
           </a:p>
         </p:txBody>
       </p:sp>
-      <p:pic>
-        <p:nvPicPr>
-          <p:cNvPr id="2" name="Picture 1"/>
-          <p:cNvPicPr>
-            <a:picLocks noChangeAspect="1"/>
-          </p:cNvPicPr>
-          <p:nvPr/>
-        </p:nvPicPr>
-        <p:blipFill>
-          <a:blip r:embed="rId3"/>
-          <a:stretch>
-            <a:fillRect/>
-          </a:stretch>
-        </p:blipFill>
-        <p:spPr>
-          <a:xfrm>
-            <a:off x="1554103" y="1418145"/>
-            <a:ext cx="4438650" cy="5210175"/>
-          </a:xfrm>
-          <a:prstGeom prst="rect">
-            <a:avLst/>
-          </a:prstGeom>
-        </p:spPr>
-      </p:pic>
-      <p:pic>
-        <p:nvPicPr>
-          <p:cNvPr id="3" name="Picture 2"/>
-          <p:cNvPicPr>
-            <a:picLocks noChangeAspect="1"/>
-          </p:cNvPicPr>
-          <p:nvPr/>
-        </p:nvPicPr>
-        <p:blipFill>
-          <a:blip r:embed="rId4"/>
-          <a:stretch>
-            <a:fillRect/>
-          </a:stretch>
-        </p:blipFill>
-        <p:spPr>
-          <a:xfrm>
-            <a:off x="6453711" y="1027620"/>
-            <a:ext cx="4438650" cy="5600700"/>
-          </a:xfrm>
-          <a:prstGeom prst="rect">
-            <a:avLst/>
-          </a:prstGeom>
-        </p:spPr>
-      </p:pic>
       <p:sp>
         <p:nvSpPr>
           <p:cNvPr id="4" name="TextBox 3"/>
@@ -35653,6 +35699,78 @@
           </a:p>
         </p:txBody>
       </p:sp>
+      <p:pic>
+        <p:nvPicPr>
+          <p:cNvPr id="6" name="Picture 5"/>
+          <p:cNvPicPr>
+            <a:picLocks noChangeAspect="1"/>
+          </p:cNvPicPr>
+          <p:nvPr/>
+        </p:nvPicPr>
+        <p:blipFill>
+          <a:blip r:embed="rId3"/>
+          <a:stretch>
+            <a:fillRect/>
+          </a:stretch>
+        </p:blipFill>
+        <p:spPr>
+          <a:xfrm>
+            <a:off x="1035660" y="1392115"/>
+            <a:ext cx="4352925" cy="5105400"/>
+          </a:xfrm>
+          <a:prstGeom prst="rect">
+            <a:avLst/>
+          </a:prstGeom>
+        </p:spPr>
+      </p:pic>
+      <p:pic>
+        <p:nvPicPr>
+          <p:cNvPr id="7" name="Picture 6"/>
+          <p:cNvPicPr>
+            <a:picLocks noChangeAspect="1"/>
+          </p:cNvPicPr>
+          <p:nvPr/>
+        </p:nvPicPr>
+        <p:blipFill>
+          <a:blip r:embed="rId4"/>
+          <a:stretch>
+            <a:fillRect/>
+          </a:stretch>
+        </p:blipFill>
+        <p:spPr>
+          <a:xfrm>
+            <a:off x="5586165" y="868241"/>
+            <a:ext cx="4257675" cy="5238750"/>
+          </a:xfrm>
+          <a:prstGeom prst="rect">
+            <a:avLst/>
+          </a:prstGeom>
+        </p:spPr>
+      </p:pic>
+      <p:pic>
+        <p:nvPicPr>
+          <p:cNvPr id="8" name="Picture 7"/>
+          <p:cNvPicPr>
+            <a:picLocks noChangeAspect="1"/>
+          </p:cNvPicPr>
+          <p:nvPr/>
+        </p:nvPicPr>
+        <p:blipFill>
+          <a:blip r:embed="rId5"/>
+          <a:stretch>
+            <a:fillRect/>
+          </a:stretch>
+        </p:blipFill>
+        <p:spPr>
+          <a:xfrm>
+            <a:off x="5652840" y="5993056"/>
+            <a:ext cx="4191000" cy="733425"/>
+          </a:xfrm>
+          <a:prstGeom prst="rect">
+            <a:avLst/>
+          </a:prstGeom>
+        </p:spPr>
+      </p:pic>
     </p:spTree>
   </p:cSld>
   <p:clrMapOvr>
@@ -35680,14 +35798,83 @@
       </p:grpSpPr>
       <p:sp>
         <p:nvSpPr>
-          <p:cNvPr id="130" name="TextShape 1"/>
+          <p:cNvPr id="119" name="CustomShape 1"/>
+          <p:cNvSpPr/>
+          <p:nvPr/>
+        </p:nvSpPr>
+        <p:spPr>
+          <a:xfrm>
+            <a:off x="838080" y="365040"/>
+            <a:ext cx="10514880" cy="1324800"/>
+          </a:xfrm>
+          <a:prstGeom prst="rect">
+            <a:avLst/>
+          </a:prstGeom>
+          <a:noFill/>
+          <a:ln>
+            <a:noFill/>
+          </a:ln>
+        </p:spPr>
+        <p:style>
+          <a:lnRef idx="0">
+            <a:scrgbClr r="0" g="0" b="0"/>
+          </a:lnRef>
+          <a:fillRef idx="0">
+            <a:scrgbClr r="0" g="0" b="0"/>
+          </a:fillRef>
+          <a:effectRef idx="0">
+            <a:scrgbClr r="0" g="0" b="0"/>
+          </a:effectRef>
+          <a:fontRef idx="minor"/>
+        </p:style>
+        <p:txBody>
+          <a:bodyPr lIns="90000" tIns="45000" rIns="90000" bIns="45000" anchor="ctr"/>
+          <a:lstStyle/>
+          <a:p>
+            <a:pPr>
+              <a:lnSpc>
+                <a:spcPct val="90000"/>
+              </a:lnSpc>
+            </a:pPr>
+            <a:r>
+              <a:rPr lang="sv-SE" sz="4400" b="0" strike="noStrike" spc="-1">
+                <a:solidFill>
+                  <a:srgbClr val="000000"/>
+                </a:solidFill>
+                <a:uFill>
+                  <a:solidFill>
+                    <a:srgbClr val="FFFFFF"/>
+                  </a:solidFill>
+                </a:uFill>
+                <a:latin typeface="Calibri Light"/>
+                <a:ea typeface="DejaVu Sans"/>
+              </a:rPr>
+              <a:t>Erfarenheter av granskning</a:t>
+            </a:r>
+            <a:endParaRPr lang="sv-SE" sz="1800" b="0" strike="noStrike" spc="-1">
+              <a:solidFill>
+                <a:srgbClr val="000000"/>
+              </a:solidFill>
+              <a:uFill>
+                <a:solidFill>
+                  <a:srgbClr val="FFFFFF"/>
+                </a:solidFill>
+              </a:uFill>
+              <a:latin typeface="Arial"/>
+            </a:endParaRPr>
+          </a:p>
+        </p:txBody>
+      </p:sp>
+      <p:sp>
+        <p:nvSpPr>
+          <p:cNvPr id="120" name="TextShape 2"/>
           <p:cNvSpPr txBox="1"/>
           <p:nvPr/>
         </p:nvSpPr>
         <p:spPr>
           <a:xfrm>
-            <a:off x="838080" y="365040"/>
-            <a:ext cx="10515240" cy="1325160"/>
+            <a:off x="838080" y="1944000"/>
+            <a:ext cx="9864000" cy="3673800"/>
           </a:xfrm>
           <a:prstGeom prst="rect">
             <a:avLst/>
@@ -35698,64 +35885,160 @@
           </a:ln>
         </p:spPr>
         <p:txBody>
-          <a:bodyPr anchor="ctr"/>
+          <a:bodyPr lIns="90000" tIns="45000" rIns="90000" bIns="45000"/>
           <a:lstStyle/>
           <a:p>
-            <a:pPr>
-              <a:lnSpc>
-                <a:spcPct val="90000"/>
-              </a:lnSpc>
-            </a:pPr>
-            <a:r>
-              <a:rPr lang="sv-SE" sz="4400" strike="noStrike" spc="-1">
-                <a:solidFill>
-                  <a:srgbClr val="000000"/>
-                </a:solidFill>
-                <a:uFill>
-                  <a:solidFill>
-                    <a:srgbClr val="FFFFFF"/>
-                  </a:solidFill>
-                </a:uFill>
-                <a:latin typeface="Calibri Light"/>
-              </a:rPr>
-              <a:t>Erfarenheter av granskning</a:t>
-            </a:r>
-            <a:endParaRPr/>
-          </a:p>
-        </p:txBody>
-      </p:sp>
-      <p:sp>
-        <p:nvSpPr>
-          <p:cNvPr id="131" name="TextShape 2"/>
-          <p:cNvSpPr txBox="1"/>
-          <p:nvPr/>
-        </p:nvSpPr>
-        <p:spPr>
-          <a:xfrm>
-            <a:off x="838080" y="1825560"/>
-            <a:ext cx="10515240" cy="4350960"/>
-          </a:xfrm>
-          <a:prstGeom prst="rect">
-            <a:avLst/>
-          </a:prstGeom>
-          <a:noFill/>
-          <a:ln>
-            <a:noFill/>
-          </a:ln>
-        </p:spPr>
-        <p:txBody>
-          <a:bodyPr/>
-          <a:lstStyle/>
-          <a:p>
-            <a:endParaRPr/>
+            <a:r>
+              <a:rPr lang="sv-SE" sz="1800" b="0" strike="noStrike" spc="-1" dirty="0">
+                <a:solidFill>
+                  <a:srgbClr val="000000"/>
+                </a:solidFill>
+                <a:uFill>
+                  <a:solidFill>
+                    <a:srgbClr val="FFFFFF"/>
+                  </a:solidFill>
+                </a:uFill>
+                <a:latin typeface="Arial"/>
+              </a:rPr>
+              <a:t>Granskning var något som alla gruppmedlemmar var överens om var en väldigt effektiv teknik. Man tvingades till att noggrant gå igenom koden rad för rad vilket inte bara förbättrar kodens kvalité utan även alla gruppmedlemmars förståelse av den. </a:t>
+            </a:r>
+          </a:p>
+          <a:p>
+            <a:endParaRPr lang="sv-SE" sz="1800" b="0" strike="noStrike" spc="-1" dirty="0">
+              <a:solidFill>
+                <a:srgbClr val="000000"/>
+              </a:solidFill>
+              <a:uFill>
+                <a:solidFill>
+                  <a:srgbClr val="FFFFFF"/>
+                </a:solidFill>
+              </a:uFill>
+              <a:latin typeface="Arial"/>
+            </a:endParaRPr>
+          </a:p>
+          <a:p>
+            <a:r>
+              <a:rPr lang="sv-SE" sz="1800" b="0" strike="noStrike" spc="-1" dirty="0">
+                <a:solidFill>
+                  <a:srgbClr val="000000"/>
+                </a:solidFill>
+                <a:uFill>
+                  <a:solidFill>
+                    <a:srgbClr val="FFFFFF"/>
+                  </a:solidFill>
+                </a:uFill>
+                <a:latin typeface="Arial"/>
+              </a:rPr>
+              <a:t>Vi genomförde granskningen ganska sent i projektet, men i efterhand är vi alla överens om att vi borde ha gjort det även tidigare då det hade hjälpt alla att förstå all kod bättre. Det hade också lett till större samsyn om uppbyggnaden av systemet.</a:t>
+            </a:r>
+          </a:p>
+          <a:p>
+            <a:endParaRPr lang="sv-SE" sz="1800" b="0" strike="noStrike" spc="-1" dirty="0">
+              <a:solidFill>
+                <a:srgbClr val="000000"/>
+              </a:solidFill>
+              <a:uFill>
+                <a:solidFill>
+                  <a:srgbClr val="FFFFFF"/>
+                </a:solidFill>
+              </a:uFill>
+              <a:latin typeface="Arial"/>
+            </a:endParaRPr>
+          </a:p>
+          <a:p>
+            <a:r>
+              <a:rPr lang="sv-SE" sz="1800" b="0" strike="noStrike" spc="-1" dirty="0">
+                <a:solidFill>
+                  <a:srgbClr val="000000"/>
+                </a:solidFill>
+                <a:uFill>
+                  <a:solidFill>
+                    <a:srgbClr val="FFFFFF"/>
+                  </a:solidFill>
+                </a:uFill>
+                <a:latin typeface="Arial"/>
+              </a:rPr>
+              <a:t>Granskningen var också ett bra tillfälle att anteckna problem som man inte vanligtvis tänkt på eller tillfälligt valt att strunta i när man skrivit koden. Man får också fram andras åsikter om hur man borde skriva koden som till exempel formateringen.</a:t>
+            </a:r>
+          </a:p>
+          <a:p>
+            <a:endParaRPr lang="sv-SE" sz="1800" b="0" strike="noStrike" spc="-1" dirty="0">
+              <a:solidFill>
+                <a:srgbClr val="000000"/>
+              </a:solidFill>
+              <a:uFill>
+                <a:solidFill>
+                  <a:srgbClr val="FFFFFF"/>
+                </a:solidFill>
+              </a:uFill>
+              <a:latin typeface="Arial"/>
+            </a:endParaRPr>
+          </a:p>
+          <a:p>
+            <a:endParaRPr lang="sv-SE" sz="1800" b="0" strike="noStrike" spc="-1" dirty="0">
+              <a:solidFill>
+                <a:srgbClr val="000000"/>
+              </a:solidFill>
+              <a:uFill>
+                <a:solidFill>
+                  <a:srgbClr val="FFFFFF"/>
+                </a:solidFill>
+              </a:uFill>
+              <a:latin typeface="Arial"/>
+            </a:endParaRPr>
+          </a:p>
+          <a:p>
+            <a:endParaRPr lang="sv-SE" sz="1800" b="0" strike="noStrike" spc="-1" dirty="0">
+              <a:solidFill>
+                <a:srgbClr val="000000"/>
+              </a:solidFill>
+              <a:uFill>
+                <a:solidFill>
+                  <a:srgbClr val="FFFFFF"/>
+                </a:solidFill>
+              </a:uFill>
+              <a:latin typeface="Arial"/>
+            </a:endParaRPr>
           </a:p>
         </p:txBody>
       </p:sp>
     </p:spTree>
+    <p:extLst>
+      <p:ext uri="{BB962C8B-B14F-4D97-AF65-F5344CB8AC3E}">
+        <p14:creationId xmlns:p14="http://schemas.microsoft.com/office/powerpoint/2010/main" val="1516413800"/>
+      </p:ext>
+    </p:extLst>
   </p:cSld>
   <p:clrMapOvr>
     <a:masterClrMapping/>
   </p:clrMapOvr>
+  <p:timing>
+    <p:tnLst>
+      <p:par>
+        <p:cTn id="1" dur="indefinite" restart="never" nodeType="tmRoot">
+          <p:childTnLst>
+            <p:seq>
+              <p:cTn id="2" nodeType="mainSeq"/>
+              <p:prevCondLst>
+                <p:cond evt="onPrev" delay="0">
+                  <p:tgtEl>
+                    <p:sldTgt/>
+                  </p:tgtEl>
+                </p:cond>
+              </p:prevCondLst>
+              <p:nextCondLst>
+                <p:cond evt="onNext" delay="0">
+                  <p:tgtEl>
+                    <p:sldTgt/>
+                  </p:tgtEl>
+                </p:cond>
+              </p:nextCondLst>
+            </p:seq>
+          </p:childTnLst>
+        </p:cTn>
+      </p:par>
+    </p:tnLst>
+  </p:timing>
 </p:sld>
 </file>
 
@@ -35805,7 +36088,7 @@
               </a:lnSpc>
             </a:pPr>
             <a:r>
-              <a:rPr lang="sv-SE" sz="4400" strike="noStrike" spc="-1">
+              <a:rPr lang="sv-SE" sz="4400" strike="noStrike" spc="-1" dirty="0">
                 <a:solidFill>
                   <a:srgbClr val="000000"/>
                 </a:solidFill>
@@ -35818,13 +36101,585 @@
               </a:rPr>
               <a:t>Kodkritiksystem</a:t>
             </a:r>
-            <a:endParaRPr/>
+            <a:endParaRPr dirty="0"/>
           </a:p>
         </p:txBody>
       </p:sp>
       <p:sp>
         <p:nvSpPr>
           <p:cNvPr id="133" name="TextShape 2"/>
+          <p:cNvSpPr txBox="1"/>
+          <p:nvPr/>
+        </p:nvSpPr>
+        <p:spPr>
+          <a:xfrm>
+            <a:off x="4810707" y="1283601"/>
+            <a:ext cx="7092612" cy="3259824"/>
+          </a:xfrm>
+          <a:prstGeom prst="rect">
+            <a:avLst/>
+          </a:prstGeom>
+          <a:noFill/>
+          <a:ln>
+            <a:noFill/>
+          </a:ln>
+        </p:spPr>
+        <p:txBody>
+          <a:bodyPr/>
+          <a:lstStyle/>
+          <a:p>
+            <a:r>
+              <a:rPr lang="sv-SE" dirty="0" smtClean="0"/>
+              <a:t>Ingen av oss hade testat </a:t>
+            </a:r>
+            <a:r>
+              <a:rPr lang="sv-SE" dirty="0" err="1" smtClean="0"/>
+              <a:t>FindBugs</a:t>
+            </a:r>
+            <a:r>
+              <a:rPr lang="sv-SE" dirty="0" smtClean="0"/>
+              <a:t> innan men blev positivt överraskade över hur användbart det var. Denna erfarenhet kommer vi ta med oss i framtiden. </a:t>
+            </a:r>
+          </a:p>
+          <a:p>
+            <a:r>
+              <a:rPr lang="sv-SE" dirty="0" smtClean="0"/>
+              <a:t>Vi hittade fel gällande namnkonventioner och namngivning som kan göra att koden blir svår att underhålla och förstå av andra personer, men som i sig inte orsakar fel i funktionaliteten. På samma sätt hittade vi även saker som gör att systemet kan uppfattas som oanvändarvänligt.</a:t>
+            </a:r>
+          </a:p>
+          <a:p>
+            <a:r>
+              <a:rPr lang="sv-SE" dirty="0" err="1" smtClean="0"/>
+              <a:t>FindBugs</a:t>
+            </a:r>
+            <a:r>
+              <a:rPr lang="sv-SE" dirty="0" smtClean="0"/>
+              <a:t> i sin tur hittade fel gällande prestanda som vi inte hittade, vilket var väldigt bra.</a:t>
+            </a:r>
+            <a:endParaRPr dirty="0"/>
+          </a:p>
+        </p:txBody>
+      </p:sp>
+      <p:pic>
+        <p:nvPicPr>
+          <p:cNvPr id="3" name="Picture 2"/>
+          <p:cNvPicPr>
+            <a:picLocks noChangeAspect="1"/>
+          </p:cNvPicPr>
+          <p:nvPr/>
+        </p:nvPicPr>
+        <p:blipFill>
+          <a:blip r:embed="rId3"/>
+          <a:stretch>
+            <a:fillRect/>
+          </a:stretch>
+        </p:blipFill>
+        <p:spPr>
+          <a:xfrm>
+            <a:off x="500062" y="1416952"/>
+            <a:ext cx="4123753" cy="2955024"/>
+          </a:xfrm>
+          <a:prstGeom prst="rect">
+            <a:avLst/>
+          </a:prstGeom>
+        </p:spPr>
+      </p:pic>
+    </p:spTree>
+  </p:cSld>
+  <p:clrMapOvr>
+    <a:masterClrMapping/>
+  </p:clrMapOvr>
+</p:sld>
+</file>
+
+<file path=ppt/slides/slide29.xml><?xml version="1.0" encoding="utf-8"?>
+<p:sld xmlns:a="http://schemas.openxmlformats.org/drawingml/2006/main" xmlns:r="http://schemas.openxmlformats.org/officeDocument/2006/relationships" xmlns:p="http://schemas.openxmlformats.org/presentationml/2006/main">
+  <p:cSld>
+    <p:spTree>
+      <p:nvGrpSpPr>
+        <p:cNvPr id="1" name=""/>
+        <p:cNvGrpSpPr/>
+        <p:nvPr/>
+      </p:nvGrpSpPr>
+      <p:grpSpPr>
+        <a:xfrm>
+          <a:off x="0" y="0"/>
+          <a:ext cx="0" cy="0"/>
+          <a:chOff x="0" y="0"/>
+          <a:chExt cx="0" cy="0"/>
+        </a:xfrm>
+      </p:grpSpPr>
+      <p:pic>
+        <p:nvPicPr>
+          <p:cNvPr id="4" name="Picture 3"/>
+          <p:cNvPicPr>
+            <a:picLocks noChangeAspect="1"/>
+          </p:cNvPicPr>
+          <p:nvPr/>
+        </p:nvPicPr>
+        <p:blipFill>
+          <a:blip r:embed="rId2"/>
+          <a:stretch>
+            <a:fillRect/>
+          </a:stretch>
+        </p:blipFill>
+        <p:spPr>
+          <a:xfrm>
+            <a:off x="185305" y="196127"/>
+            <a:ext cx="2641022" cy="2550771"/>
+          </a:xfrm>
+          <a:prstGeom prst="rect">
+            <a:avLst/>
+          </a:prstGeom>
+        </p:spPr>
+      </p:pic>
+      <p:pic>
+        <p:nvPicPr>
+          <p:cNvPr id="5" name="Picture 4"/>
+          <p:cNvPicPr>
+            <a:picLocks noChangeAspect="1"/>
+          </p:cNvPicPr>
+          <p:nvPr/>
+        </p:nvPicPr>
+        <p:blipFill>
+          <a:blip r:embed="rId3"/>
+          <a:stretch>
+            <a:fillRect/>
+          </a:stretch>
+        </p:blipFill>
+        <p:spPr>
+          <a:xfrm>
+            <a:off x="2991282" y="196127"/>
+            <a:ext cx="2523537" cy="2912486"/>
+          </a:xfrm>
+          <a:prstGeom prst="rect">
+            <a:avLst/>
+          </a:prstGeom>
+        </p:spPr>
+      </p:pic>
+      <p:pic>
+        <p:nvPicPr>
+          <p:cNvPr id="6" name="Picture 5"/>
+          <p:cNvPicPr>
+            <a:picLocks noChangeAspect="1"/>
+          </p:cNvPicPr>
+          <p:nvPr/>
+        </p:nvPicPr>
+        <p:blipFill>
+          <a:blip r:embed="rId4"/>
+          <a:stretch>
+            <a:fillRect/>
+          </a:stretch>
+        </p:blipFill>
+        <p:spPr>
+          <a:xfrm>
+            <a:off x="5679774" y="196127"/>
+            <a:ext cx="2342008" cy="2805262"/>
+          </a:xfrm>
+          <a:prstGeom prst="rect">
+            <a:avLst/>
+          </a:prstGeom>
+        </p:spPr>
+      </p:pic>
+      <p:pic>
+        <p:nvPicPr>
+          <p:cNvPr id="7" name="Picture 6"/>
+          <p:cNvPicPr>
+            <a:picLocks noChangeAspect="1"/>
+          </p:cNvPicPr>
+          <p:nvPr/>
+        </p:nvPicPr>
+        <p:blipFill>
+          <a:blip r:embed="rId5"/>
+          <a:stretch>
+            <a:fillRect/>
+          </a:stretch>
+        </p:blipFill>
+        <p:spPr>
+          <a:xfrm>
+            <a:off x="8333880" y="196128"/>
+            <a:ext cx="3858119" cy="2805262"/>
+          </a:xfrm>
+          <a:prstGeom prst="rect">
+            <a:avLst/>
+          </a:prstGeom>
+        </p:spPr>
+      </p:pic>
+      <p:pic>
+        <p:nvPicPr>
+          <p:cNvPr id="8" name="Picture 7"/>
+          <p:cNvPicPr>
+            <a:picLocks noChangeAspect="1"/>
+          </p:cNvPicPr>
+          <p:nvPr/>
+        </p:nvPicPr>
+        <p:blipFill>
+          <a:blip r:embed="rId6"/>
+          <a:stretch>
+            <a:fillRect/>
+          </a:stretch>
+        </p:blipFill>
+        <p:spPr>
+          <a:xfrm>
+            <a:off x="685995" y="3460172"/>
+            <a:ext cx="2670269" cy="3217132"/>
+          </a:xfrm>
+          <a:prstGeom prst="rect">
+            <a:avLst/>
+          </a:prstGeom>
+        </p:spPr>
+      </p:pic>
+      <p:pic>
+        <p:nvPicPr>
+          <p:cNvPr id="9" name="Picture 8"/>
+          <p:cNvPicPr>
+            <a:picLocks noChangeAspect="1"/>
+          </p:cNvPicPr>
+          <p:nvPr/>
+        </p:nvPicPr>
+        <p:blipFill>
+          <a:blip r:embed="rId7"/>
+          <a:stretch>
+            <a:fillRect/>
+          </a:stretch>
+        </p:blipFill>
+        <p:spPr>
+          <a:xfrm>
+            <a:off x="3833085" y="3418196"/>
+            <a:ext cx="3017693" cy="3259108"/>
+          </a:xfrm>
+          <a:prstGeom prst="rect">
+            <a:avLst/>
+          </a:prstGeom>
+        </p:spPr>
+      </p:pic>
+      <p:pic>
+        <p:nvPicPr>
+          <p:cNvPr id="10" name="Picture 9"/>
+          <p:cNvPicPr>
+            <a:picLocks noChangeAspect="1"/>
+          </p:cNvPicPr>
+          <p:nvPr/>
+        </p:nvPicPr>
+        <p:blipFill>
+          <a:blip r:embed="rId8"/>
+          <a:stretch>
+            <a:fillRect/>
+          </a:stretch>
+        </p:blipFill>
+        <p:spPr>
+          <a:xfrm>
+            <a:off x="7405547" y="3418196"/>
+            <a:ext cx="3522665" cy="3259108"/>
+          </a:xfrm>
+          <a:prstGeom prst="rect">
+            <a:avLst/>
+          </a:prstGeom>
+        </p:spPr>
+      </p:pic>
+      <p:sp>
+        <p:nvSpPr>
+          <p:cNvPr id="11" name="TextBox 10"/>
+          <p:cNvSpPr txBox="1"/>
+          <p:nvPr/>
+        </p:nvSpPr>
+        <p:spPr>
+          <a:xfrm>
+            <a:off x="-1731" y="196127"/>
+            <a:ext cx="417102" cy="369332"/>
+          </a:xfrm>
+          <a:prstGeom prst="rect">
+            <a:avLst/>
+          </a:prstGeom>
+          <a:noFill/>
+        </p:spPr>
+        <p:txBody>
+          <a:bodyPr wrap="none" rtlCol="0">
+            <a:spAutoFit/>
+          </a:bodyPr>
+          <a:lstStyle/>
+          <a:p>
+            <a:r>
+              <a:rPr lang="sv-SE" dirty="0" smtClean="0"/>
+              <a:t>#1</a:t>
+            </a:r>
+            <a:endParaRPr lang="sv-SE" dirty="0"/>
+          </a:p>
+        </p:txBody>
+      </p:sp>
+      <p:sp>
+        <p:nvSpPr>
+          <p:cNvPr id="12" name="TextBox 11"/>
+          <p:cNvSpPr txBox="1"/>
+          <p:nvPr/>
+        </p:nvSpPr>
+        <p:spPr>
+          <a:xfrm>
+            <a:off x="2765110" y="223629"/>
+            <a:ext cx="417102" cy="369332"/>
+          </a:xfrm>
+          <a:prstGeom prst="rect">
+            <a:avLst/>
+          </a:prstGeom>
+          <a:noFill/>
+        </p:spPr>
+        <p:txBody>
+          <a:bodyPr wrap="none" rtlCol="0">
+            <a:spAutoFit/>
+          </a:bodyPr>
+          <a:lstStyle/>
+          <a:p>
+            <a:r>
+              <a:rPr lang="sv-SE" dirty="0" smtClean="0"/>
+              <a:t>#2</a:t>
+            </a:r>
+            <a:endParaRPr lang="sv-SE" dirty="0"/>
+          </a:p>
+        </p:txBody>
+      </p:sp>
+      <p:sp>
+        <p:nvSpPr>
+          <p:cNvPr id="13" name="TextBox 12"/>
+          <p:cNvSpPr txBox="1"/>
+          <p:nvPr/>
+        </p:nvSpPr>
+        <p:spPr>
+          <a:xfrm>
+            <a:off x="5471223" y="223629"/>
+            <a:ext cx="417102" cy="369332"/>
+          </a:xfrm>
+          <a:prstGeom prst="rect">
+            <a:avLst/>
+          </a:prstGeom>
+          <a:noFill/>
+        </p:spPr>
+        <p:txBody>
+          <a:bodyPr wrap="none" rtlCol="0">
+            <a:spAutoFit/>
+          </a:bodyPr>
+          <a:lstStyle/>
+          <a:p>
+            <a:r>
+              <a:rPr lang="sv-SE" dirty="0" smtClean="0"/>
+              <a:t>#3</a:t>
+            </a:r>
+            <a:endParaRPr lang="sv-SE" dirty="0"/>
+          </a:p>
+        </p:txBody>
+      </p:sp>
+      <p:sp>
+        <p:nvSpPr>
+          <p:cNvPr id="14" name="TextBox 13"/>
+          <p:cNvSpPr txBox="1"/>
+          <p:nvPr/>
+        </p:nvSpPr>
+        <p:spPr>
+          <a:xfrm>
+            <a:off x="8030290" y="251131"/>
+            <a:ext cx="417102" cy="369332"/>
+          </a:xfrm>
+          <a:prstGeom prst="rect">
+            <a:avLst/>
+          </a:prstGeom>
+          <a:noFill/>
+        </p:spPr>
+        <p:txBody>
+          <a:bodyPr wrap="none" rtlCol="0">
+            <a:spAutoFit/>
+          </a:bodyPr>
+          <a:lstStyle/>
+          <a:p>
+            <a:r>
+              <a:rPr lang="sv-SE" dirty="0" smtClean="0"/>
+              <a:t>#4</a:t>
+            </a:r>
+            <a:endParaRPr lang="sv-SE" dirty="0"/>
+          </a:p>
+        </p:txBody>
+      </p:sp>
+      <p:sp>
+        <p:nvSpPr>
+          <p:cNvPr id="15" name="TextBox 14"/>
+          <p:cNvSpPr txBox="1"/>
+          <p:nvPr/>
+        </p:nvSpPr>
+        <p:spPr>
+          <a:xfrm>
+            <a:off x="268893" y="3468285"/>
+            <a:ext cx="417102" cy="369332"/>
+          </a:xfrm>
+          <a:prstGeom prst="rect">
+            <a:avLst/>
+          </a:prstGeom>
+          <a:noFill/>
+        </p:spPr>
+        <p:txBody>
+          <a:bodyPr wrap="none" rtlCol="0">
+            <a:spAutoFit/>
+          </a:bodyPr>
+          <a:lstStyle/>
+          <a:p>
+            <a:r>
+              <a:rPr lang="sv-SE" dirty="0" smtClean="0"/>
+              <a:t>#5</a:t>
+            </a:r>
+            <a:endParaRPr lang="sv-SE" dirty="0"/>
+          </a:p>
+        </p:txBody>
+      </p:sp>
+      <p:sp>
+        <p:nvSpPr>
+          <p:cNvPr id="16" name="TextBox 15"/>
+          <p:cNvSpPr txBox="1"/>
+          <p:nvPr/>
+        </p:nvSpPr>
+        <p:spPr>
+          <a:xfrm>
+            <a:off x="3442614" y="3395136"/>
+            <a:ext cx="417102" cy="369332"/>
+          </a:xfrm>
+          <a:prstGeom prst="rect">
+            <a:avLst/>
+          </a:prstGeom>
+          <a:noFill/>
+        </p:spPr>
+        <p:txBody>
+          <a:bodyPr wrap="none" rtlCol="0">
+            <a:spAutoFit/>
+          </a:bodyPr>
+          <a:lstStyle/>
+          <a:p>
+            <a:r>
+              <a:rPr lang="sv-SE" dirty="0" smtClean="0"/>
+              <a:t>#6</a:t>
+            </a:r>
+            <a:endParaRPr lang="sv-SE" dirty="0"/>
+          </a:p>
+        </p:txBody>
+      </p:sp>
+      <p:sp>
+        <p:nvSpPr>
+          <p:cNvPr id="17" name="TextBox 16"/>
+          <p:cNvSpPr txBox="1"/>
+          <p:nvPr/>
+        </p:nvSpPr>
+        <p:spPr>
+          <a:xfrm>
+            <a:off x="7041707" y="3385367"/>
+            <a:ext cx="417102" cy="369332"/>
+          </a:xfrm>
+          <a:prstGeom prst="rect">
+            <a:avLst/>
+          </a:prstGeom>
+          <a:noFill/>
+        </p:spPr>
+        <p:txBody>
+          <a:bodyPr wrap="none" rtlCol="0">
+            <a:spAutoFit/>
+          </a:bodyPr>
+          <a:lstStyle/>
+          <a:p>
+            <a:r>
+              <a:rPr lang="sv-SE" dirty="0" smtClean="0"/>
+              <a:t>#7</a:t>
+            </a:r>
+            <a:endParaRPr lang="sv-SE" dirty="0"/>
+          </a:p>
+        </p:txBody>
+      </p:sp>
+    </p:spTree>
+    <p:extLst>
+      <p:ext uri="{BB962C8B-B14F-4D97-AF65-F5344CB8AC3E}">
+        <p14:creationId xmlns:p14="http://schemas.microsoft.com/office/powerpoint/2010/main" val="3593295331"/>
+      </p:ext>
+    </p:extLst>
+  </p:cSld>
+  <p:clrMapOvr>
+    <a:masterClrMapping/>
+  </p:clrMapOvr>
+</p:sld>
+</file>
+
+<file path=ppt/slides/slide3.xml><?xml version="1.0" encoding="utf-8"?>
+<p:sld xmlns:a="http://schemas.openxmlformats.org/drawingml/2006/main" xmlns:r="http://schemas.openxmlformats.org/officeDocument/2006/relationships" xmlns:p="http://schemas.openxmlformats.org/presentationml/2006/main">
+  <p:cSld>
+    <p:spTree>
+      <p:nvGrpSpPr>
+        <p:cNvPr id="1" name=""/>
+        <p:cNvGrpSpPr/>
+        <p:nvPr/>
+      </p:nvGrpSpPr>
+      <p:grpSpPr>
+        <a:xfrm>
+          <a:off x="0" y="0"/>
+          <a:ext cx="0" cy="0"/>
+          <a:chOff x="0" y="0"/>
+          <a:chExt cx="0" cy="0"/>
+        </a:xfrm>
+      </p:grpSpPr>
+      <p:sp>
+        <p:nvSpPr>
+          <p:cNvPr id="91" name="TextShape 1"/>
+          <p:cNvSpPr txBox="1"/>
+          <p:nvPr/>
+        </p:nvSpPr>
+        <p:spPr>
+          <a:xfrm>
+            <a:off x="838080" y="365040"/>
+            <a:ext cx="10515240" cy="1325160"/>
+          </a:xfrm>
+          <a:prstGeom prst="rect">
+            <a:avLst/>
+          </a:prstGeom>
+          <a:noFill/>
+          <a:ln>
+            <a:noFill/>
+          </a:ln>
+        </p:spPr>
+        <p:txBody>
+          <a:bodyPr anchor="ctr"/>
+          <a:lstStyle/>
+          <a:p>
+            <a:pPr>
+              <a:lnSpc>
+                <a:spcPct val="90000"/>
+              </a:lnSpc>
+            </a:pPr>
+            <a:r>
+              <a:rPr lang="sv-SE" sz="4400" strike="noStrike" spc="-1" dirty="0">
+                <a:solidFill>
+                  <a:srgbClr val="000000"/>
+                </a:solidFill>
+                <a:uFill>
+                  <a:solidFill>
+                    <a:srgbClr val="FFFFFF"/>
+                  </a:solidFill>
+                </a:uFill>
+                <a:latin typeface="Calibri Light"/>
+              </a:rPr>
+              <a:t>Slutlig </a:t>
+            </a:r>
+            <a:r>
+              <a:rPr lang="sv-SE" sz="4400" strike="noStrike" spc="-1" dirty="0" smtClean="0">
+                <a:solidFill>
+                  <a:srgbClr val="000000"/>
+                </a:solidFill>
+                <a:uFill>
+                  <a:solidFill>
+                    <a:srgbClr val="FFFFFF"/>
+                  </a:solidFill>
+                </a:uFill>
+                <a:latin typeface="Calibri Light"/>
+              </a:rPr>
+              <a:t>design - översikt</a:t>
+            </a:r>
+            <a:endParaRPr dirty="0"/>
+          </a:p>
+        </p:txBody>
+      </p:sp>
+      <p:sp>
+        <p:nvSpPr>
+          <p:cNvPr id="92" name="TextShape 2"/>
           <p:cNvSpPr txBox="1"/>
           <p:nvPr/>
         </p:nvSpPr>
@@ -35849,15 +36704,90 @@
           </a:p>
         </p:txBody>
       </p:sp>
+      <p:pic>
+        <p:nvPicPr>
+          <p:cNvPr id="3" name="Picture 2"/>
+          <p:cNvPicPr>
+            <a:picLocks noChangeAspect="1"/>
+          </p:cNvPicPr>
+          <p:nvPr/>
+        </p:nvPicPr>
+        <p:blipFill>
+          <a:blip r:embed="rId3"/>
+          <a:stretch>
+            <a:fillRect/>
+          </a:stretch>
+        </p:blipFill>
+        <p:spPr>
+          <a:xfrm>
+            <a:off x="6897341" y="1782540"/>
+            <a:ext cx="4911031" cy="3192721"/>
+          </a:xfrm>
+          <a:prstGeom prst="rect">
+            <a:avLst/>
+          </a:prstGeom>
+        </p:spPr>
+      </p:pic>
+      <p:pic>
+        <p:nvPicPr>
+          <p:cNvPr id="4" name="Picture 3"/>
+          <p:cNvPicPr>
+            <a:picLocks noChangeAspect="1"/>
+          </p:cNvPicPr>
+          <p:nvPr/>
+        </p:nvPicPr>
+        <p:blipFill>
+          <a:blip r:embed="rId4"/>
+          <a:stretch>
+            <a:fillRect/>
+          </a:stretch>
+        </p:blipFill>
+        <p:spPr>
+          <a:xfrm>
+            <a:off x="306283" y="1782540"/>
+            <a:ext cx="6370381" cy="4515601"/>
+          </a:xfrm>
+          <a:prstGeom prst="rect">
+            <a:avLst/>
+          </a:prstGeom>
+        </p:spPr>
+      </p:pic>
     </p:spTree>
   </p:cSld>
   <p:clrMapOvr>
     <a:masterClrMapping/>
   </p:clrMapOvr>
+  <p:timing>
+    <p:tnLst>
+      <p:par>
+        <p:cTn id="1" dur="indefinite" restart="never" nodeType="tmRoot">
+          <p:childTnLst>
+            <p:seq>
+              <p:cTn id="2" nodeType="mainSeq"/>
+              <p:prevCondLst>
+                <p:cond evt="onPrev" delay="0">
+                  <p:tgtEl>
+                    <p:sldTgt/>
+                  </p:tgtEl>
+                </p:cond>
+              </p:prevCondLst>
+              <p:nextCondLst>
+                <p:cond evt="onNext" delay="0">
+                  <p:tgtEl>
+                    <p:sldTgt/>
+                  </p:tgtEl>
+                </p:cond>
+              </p:nextCondLst>
+            </p:seq>
+          </p:childTnLst>
+        </p:cTn>
+      </p:par>
+    </p:tnLst>
+  </p:timing>
 </p:sld>
 </file>
 
-<file path=ppt/slides/slide29.xml><?xml version="1.0" encoding="utf-8"?>
+<file path=ppt/slides/slide30.xml><?xml version="1.0" encoding="utf-8"?>
 <p:sld xmlns:a="http://schemas.openxmlformats.org/drawingml/2006/main" xmlns:r="http://schemas.openxmlformats.org/officeDocument/2006/relationships" xmlns:p="http://schemas.openxmlformats.org/presentationml/2006/main">
   <p:cSld>
     <p:spTree>
@@ -37193,194 +38123,7 @@
 </p:sld>
 </file>
 
-<file path=ppt/slides/slide3.xml><?xml version="1.0" encoding="utf-8"?>
-<p:sld xmlns:a="http://schemas.openxmlformats.org/drawingml/2006/main" xmlns:r="http://schemas.openxmlformats.org/officeDocument/2006/relationships" xmlns:p="http://schemas.openxmlformats.org/presentationml/2006/main">
-  <p:cSld>
-    <p:spTree>
-      <p:nvGrpSpPr>
-        <p:cNvPr id="1" name=""/>
-        <p:cNvGrpSpPr/>
-        <p:nvPr/>
-      </p:nvGrpSpPr>
-      <p:grpSpPr>
-        <a:xfrm>
-          <a:off x="0" y="0"/>
-          <a:ext cx="0" cy="0"/>
-          <a:chOff x="0" y="0"/>
-          <a:chExt cx="0" cy="0"/>
-        </a:xfrm>
-      </p:grpSpPr>
-      <p:sp>
-        <p:nvSpPr>
-          <p:cNvPr id="91" name="TextShape 1"/>
-          <p:cNvSpPr txBox="1"/>
-          <p:nvPr/>
-        </p:nvSpPr>
-        <p:spPr>
-          <a:xfrm>
-            <a:off x="838080" y="365040"/>
-            <a:ext cx="10515240" cy="1325160"/>
-          </a:xfrm>
-          <a:prstGeom prst="rect">
-            <a:avLst/>
-          </a:prstGeom>
-          <a:noFill/>
-          <a:ln>
-            <a:noFill/>
-          </a:ln>
-        </p:spPr>
-        <p:txBody>
-          <a:bodyPr anchor="ctr"/>
-          <a:lstStyle/>
-          <a:p>
-            <a:pPr>
-              <a:lnSpc>
-                <a:spcPct val="90000"/>
-              </a:lnSpc>
-            </a:pPr>
-            <a:r>
-              <a:rPr lang="sv-SE" sz="4400" strike="noStrike" spc="-1" dirty="0">
-                <a:solidFill>
-                  <a:srgbClr val="000000"/>
-                </a:solidFill>
-                <a:uFill>
-                  <a:solidFill>
-                    <a:srgbClr val="FFFFFF"/>
-                  </a:solidFill>
-                </a:uFill>
-                <a:latin typeface="Calibri Light"/>
-              </a:rPr>
-              <a:t>Slutlig </a:t>
-            </a:r>
-            <a:r>
-              <a:rPr lang="sv-SE" sz="4400" strike="noStrike" spc="-1" dirty="0" smtClean="0">
-                <a:solidFill>
-                  <a:srgbClr val="000000"/>
-                </a:solidFill>
-                <a:uFill>
-                  <a:solidFill>
-                    <a:srgbClr val="FFFFFF"/>
-                  </a:solidFill>
-                </a:uFill>
-                <a:latin typeface="Calibri Light"/>
-              </a:rPr>
-              <a:t>design - översikt</a:t>
-            </a:r>
-            <a:endParaRPr dirty="0"/>
-          </a:p>
-        </p:txBody>
-      </p:sp>
-      <p:sp>
-        <p:nvSpPr>
-          <p:cNvPr id="92" name="TextShape 2"/>
-          <p:cNvSpPr txBox="1"/>
-          <p:nvPr/>
-        </p:nvSpPr>
-        <p:spPr>
-          <a:xfrm>
-            <a:off x="838080" y="1825560"/>
-            <a:ext cx="10515240" cy="4350960"/>
-          </a:xfrm>
-          <a:prstGeom prst="rect">
-            <a:avLst/>
-          </a:prstGeom>
-          <a:noFill/>
-          <a:ln>
-            <a:noFill/>
-          </a:ln>
-        </p:spPr>
-        <p:txBody>
-          <a:bodyPr/>
-          <a:lstStyle/>
-          <a:p>
-            <a:endParaRPr/>
-          </a:p>
-        </p:txBody>
-      </p:sp>
-      <p:pic>
-        <p:nvPicPr>
-          <p:cNvPr id="3" name="Picture 2"/>
-          <p:cNvPicPr>
-            <a:picLocks noChangeAspect="1"/>
-          </p:cNvPicPr>
-          <p:nvPr/>
-        </p:nvPicPr>
-        <p:blipFill>
-          <a:blip r:embed="rId3"/>
-          <a:stretch>
-            <a:fillRect/>
-          </a:stretch>
-        </p:blipFill>
-        <p:spPr>
-          <a:xfrm>
-            <a:off x="6897341" y="1782540"/>
-            <a:ext cx="4911031" cy="3192721"/>
-          </a:xfrm>
-          <a:prstGeom prst="rect">
-            <a:avLst/>
-          </a:prstGeom>
-        </p:spPr>
-      </p:pic>
-      <p:pic>
-        <p:nvPicPr>
-          <p:cNvPr id="4" name="Picture 3"/>
-          <p:cNvPicPr>
-            <a:picLocks noChangeAspect="1"/>
-          </p:cNvPicPr>
-          <p:nvPr/>
-        </p:nvPicPr>
-        <p:blipFill>
-          <a:blip r:embed="rId4"/>
-          <a:stretch>
-            <a:fillRect/>
-          </a:stretch>
-        </p:blipFill>
-        <p:spPr>
-          <a:xfrm>
-            <a:off x="306283" y="1782540"/>
-            <a:ext cx="6370381" cy="4515601"/>
-          </a:xfrm>
-          <a:prstGeom prst="rect">
-            <a:avLst/>
-          </a:prstGeom>
-        </p:spPr>
-      </p:pic>
-    </p:spTree>
-  </p:cSld>
-  <p:clrMapOvr>
-    <a:masterClrMapping/>
-  </p:clrMapOvr>
-  <p:timing>
-    <p:tnLst>
-      <p:par>
-        <p:cTn id="1" dur="indefinite" restart="never" nodeType="tmRoot">
-          <p:childTnLst>
-            <p:seq>
-              <p:cTn id="2" nodeType="mainSeq"/>
-              <p:prevCondLst>
-                <p:cond evt="onPrev" delay="0">
-                  <p:tgtEl>
-                    <p:sldTgt/>
-                  </p:tgtEl>
-                </p:cond>
-              </p:prevCondLst>
-              <p:nextCondLst>
-                <p:cond evt="onNext" delay="0">
-                  <p:tgtEl>
-                    <p:sldTgt/>
-                  </p:tgtEl>
-                </p:cond>
-              </p:nextCondLst>
-            </p:seq>
-          </p:childTnLst>
-        </p:cTn>
-      </p:par>
-    </p:tnLst>
-  </p:timing>
-</p:sld>
-</file>
-
-<file path=ppt/slides/slide30.xml><?xml version="1.0" encoding="utf-8"?>
+<file path=ppt/slides/slide31.xml><?xml version="1.0" encoding="utf-8"?>
 <p:sld xmlns:a="http://schemas.openxmlformats.org/drawingml/2006/main" xmlns:r="http://schemas.openxmlformats.org/officeDocument/2006/relationships" xmlns:p="http://schemas.openxmlformats.org/presentationml/2006/main">
   <p:cSld>
     <p:spTree>
@@ -37478,7 +38221,7 @@
 </p:sld>
 </file>
 
-<file path=ppt/slides/slide31.xml><?xml version="1.0" encoding="utf-8"?>
+<file path=ppt/slides/slide32.xml><?xml version="1.0" encoding="utf-8"?>
 <p:sld xmlns:a="http://schemas.openxmlformats.org/drawingml/2006/main" xmlns:r="http://schemas.openxmlformats.org/officeDocument/2006/relationships" xmlns:p="http://schemas.openxmlformats.org/presentationml/2006/main">
   <p:cSld>
     <p:spTree>
@@ -37497,14 +38240,115 @@
       </p:grpSpPr>
       <p:sp>
         <p:nvSpPr>
-          <p:cNvPr id="138" name="TextShape 1"/>
+          <p:cNvPr id="119" name="CustomShape 1"/>
+          <p:cNvSpPr/>
+          <p:nvPr/>
+        </p:nvSpPr>
+        <p:spPr>
+          <a:xfrm>
+            <a:off x="838080" y="365040"/>
+            <a:ext cx="10514880" cy="1324800"/>
+          </a:xfrm>
+          <a:prstGeom prst="rect">
+            <a:avLst/>
+          </a:prstGeom>
+          <a:noFill/>
+          <a:ln>
+            <a:noFill/>
+          </a:ln>
+        </p:spPr>
+        <p:style>
+          <a:lnRef idx="0">
+            <a:scrgbClr r="0" g="0" b="0"/>
+          </a:lnRef>
+          <a:fillRef idx="0">
+            <a:scrgbClr r="0" g="0" b="0"/>
+          </a:fillRef>
+          <a:effectRef idx="0">
+            <a:scrgbClr r="0" g="0" b="0"/>
+          </a:effectRef>
+          <a:fontRef idx="minor"/>
+        </p:style>
+        <p:txBody>
+          <a:bodyPr lIns="90000" tIns="45000" rIns="90000" bIns="45000" anchor="ctr"/>
+          <a:lstStyle/>
+          <a:p>
+            <a:pPr>
+              <a:lnSpc>
+                <a:spcPct val="90000"/>
+              </a:lnSpc>
+            </a:pPr>
+            <a:r>
+              <a:rPr lang="sv-SE" sz="4400" b="0" strike="noStrike" spc="-1">
+                <a:solidFill>
+                  <a:srgbClr val="000000"/>
+                </a:solidFill>
+                <a:uFill>
+                  <a:solidFill>
+                    <a:srgbClr val="FFFFFF"/>
+                  </a:solidFill>
+                </a:uFill>
+                <a:latin typeface="Calibri Light"/>
+                <a:ea typeface="DejaVu Sans"/>
+              </a:rPr>
+              <a:t>Profiler</a:t>
+            </a:r>
+            <a:endParaRPr lang="sv-SE" sz="1800" b="0" strike="noStrike" spc="-1">
+              <a:solidFill>
+                <a:srgbClr val="000000"/>
+              </a:solidFill>
+              <a:uFill>
+                <a:solidFill>
+                  <a:srgbClr val="FFFFFF"/>
+                </a:solidFill>
+              </a:uFill>
+              <a:latin typeface="Arial"/>
+            </a:endParaRPr>
+          </a:p>
+        </p:txBody>
+      </p:sp>
+      <p:sp>
+        <p:nvSpPr>
+          <p:cNvPr id="120" name="CustomShape 2"/>
+          <p:cNvSpPr/>
+          <p:nvPr/>
+        </p:nvSpPr>
+        <p:spPr>
+          <a:xfrm>
+            <a:off x="838080" y="1825560"/>
+            <a:ext cx="10514880" cy="4350600"/>
+          </a:xfrm>
+          <a:prstGeom prst="rect">
+            <a:avLst/>
+          </a:prstGeom>
+          <a:noFill/>
+          <a:ln>
+            <a:noFill/>
+          </a:ln>
+        </p:spPr>
+        <p:style>
+          <a:lnRef idx="0">
+            <a:scrgbClr r="0" g="0" b="0"/>
+          </a:lnRef>
+          <a:fillRef idx="0">
+            <a:scrgbClr r="0" g="0" b="0"/>
+          </a:fillRef>
+          <a:effectRef idx="0">
+            <a:scrgbClr r="0" g="0" b="0"/>
+          </a:effectRef>
+          <a:fontRef idx="minor"/>
+        </p:style>
+      </p:sp>
+      <p:sp>
+        <p:nvSpPr>
+          <p:cNvPr id="121" name="TextShape 3"/>
           <p:cNvSpPr txBox="1"/>
           <p:nvPr/>
         </p:nvSpPr>
         <p:spPr>
           <a:xfrm>
-            <a:off x="838080" y="365040"/>
-            <a:ext cx="10515240" cy="1325160"/>
+            <a:off x="432000" y="1350000"/>
+            <a:ext cx="10800000" cy="2394000"/>
           </a:xfrm>
           <a:prstGeom prst="rect">
             <a:avLst/>
@@ -37515,68 +38359,144 @@
           </a:ln>
         </p:spPr>
         <p:txBody>
-          <a:bodyPr anchor="ctr"/>
+          <a:bodyPr lIns="90000" tIns="45000" rIns="90000" bIns="45000"/>
           <a:lstStyle/>
           <a:p>
-            <a:pPr>
-              <a:lnSpc>
-                <a:spcPct val="90000"/>
-              </a:lnSpc>
-            </a:pPr>
-            <a:r>
-              <a:rPr lang="sv-SE" sz="4400" strike="noStrike" spc="-1">
-                <a:solidFill>
-                  <a:srgbClr val="000000"/>
-                </a:solidFill>
-                <a:uFill>
-                  <a:solidFill>
-                    <a:srgbClr val="FFFFFF"/>
-                  </a:solidFill>
-                </a:uFill>
-                <a:latin typeface="Calibri Light"/>
-              </a:rPr>
-              <a:t>Profiler</a:t>
-            </a:r>
-            <a:endParaRPr/>
+            <a:r>
+              <a:rPr lang="sv-SE" sz="1800" b="0" strike="noStrike" spc="-1">
+                <a:solidFill>
+                  <a:srgbClr val="000000"/>
+                </a:solidFill>
+                <a:uFill>
+                  <a:solidFill>
+                    <a:srgbClr val="FFFFFF"/>
+                  </a:solidFill>
+                </a:uFill>
+                <a:latin typeface="Arial"/>
+              </a:rPr>
+              <a:t>Vi testade hur lång tid det tog att utföra alla kommando-anrop efter varandra. Resultaten skiljde sig mycket åt mellan test-tillfällena, men generellt sätt låg exekverings-tiden för kommandona mellan 0,6 och 0,01 millisekunder.</a:t>
+            </a:r>
+          </a:p>
+          <a:p>
+            <a:endParaRPr lang="sv-SE" sz="1800" b="0" strike="noStrike" spc="-1">
+              <a:solidFill>
+                <a:srgbClr val="000000"/>
+              </a:solidFill>
+              <a:uFill>
+                <a:solidFill>
+                  <a:srgbClr val="FFFFFF"/>
+                </a:solidFill>
+              </a:uFill>
+              <a:latin typeface="Arial"/>
+            </a:endParaRPr>
+          </a:p>
+          <a:p>
+            <a:r>
+              <a:rPr lang="sv-SE" sz="1800" b="0" strike="noStrike" spc="-1">
+                <a:solidFill>
+                  <a:srgbClr val="000000"/>
+                </a:solidFill>
+                <a:uFill>
+                  <a:solidFill>
+                    <a:srgbClr val="FFFFFF"/>
+                  </a:solidFill>
+                </a:uFill>
+                <a:latin typeface="Arial"/>
+              </a:rPr>
+              <a:t>Vissa kommandon som pwd, cat och cd tog generellt sätt kortare tid att utföra, vilket kan bero på att de inte gör lika mycket som de övriga kommandona. Det finns också en grupp t.ex. repeatLast, repeatFromHistory och mkdir(s) som tar något längre tid att exekvera eftersom att de utför mer än enstaka operationer. Slutligen finns det en grupp kommandon som History, cp, touch samt ibland append och ls vilka tog en längre att utföra än de övriga vilket beror på att de utför mest operationer av alla.</a:t>
+            </a:r>
           </a:p>
         </p:txBody>
       </p:sp>
-      <p:sp>
-        <p:nvSpPr>
-          <p:cNvPr id="139" name="TextShape 2"/>
-          <p:cNvSpPr txBox="1"/>
+      <p:pic>
+        <p:nvPicPr>
+          <p:cNvPr id="122" name="Picture 121"/>
+          <p:cNvPicPr/>
           <p:nvPr/>
-        </p:nvSpPr>
+        </p:nvPicPr>
+        <p:blipFill>
+          <a:blip r:embed="rId3"/>
+          <a:srcRect l="23708" t="21901" r="10158" b="24158"/>
+          <a:stretch/>
+        </p:blipFill>
         <p:spPr>
           <a:xfrm>
-            <a:off x="838080" y="1825560"/>
-            <a:ext cx="10515240" cy="4350960"/>
+            <a:off x="6109920" y="3909960"/>
+            <a:ext cx="6121440" cy="2808000"/>
           </a:xfrm>
           <a:prstGeom prst="rect">
             <a:avLst/>
           </a:prstGeom>
-          <a:noFill/>
           <a:ln>
             <a:noFill/>
           </a:ln>
         </p:spPr>
-        <p:txBody>
-          <a:bodyPr/>
-          <a:lstStyle/>
-          <a:p>
-            <a:endParaRPr/>
-          </a:p>
-        </p:txBody>
-      </p:sp>
+      </p:pic>
+      <p:pic>
+        <p:nvPicPr>
+          <p:cNvPr id="123" name="Picture 122"/>
+          <p:cNvPicPr/>
+          <p:nvPr/>
+        </p:nvPicPr>
+        <p:blipFill>
+          <a:blip r:embed="rId4"/>
+          <a:srcRect l="22219" t="15318" r="11223" b="29316"/>
+          <a:stretch/>
+        </p:blipFill>
+        <p:spPr>
+          <a:xfrm>
+            <a:off x="72000" y="3888000"/>
+            <a:ext cx="6048000" cy="2829960"/>
+          </a:xfrm>
+          <a:prstGeom prst="rect">
+            <a:avLst/>
+          </a:prstGeom>
+          <a:ln>
+            <a:noFill/>
+          </a:ln>
+        </p:spPr>
+      </p:pic>
     </p:spTree>
+    <p:extLst>
+      <p:ext uri="{BB962C8B-B14F-4D97-AF65-F5344CB8AC3E}">
+        <p14:creationId xmlns:p14="http://schemas.microsoft.com/office/powerpoint/2010/main" val="571930113"/>
+      </p:ext>
+    </p:extLst>
   </p:cSld>
   <p:clrMapOvr>
     <a:masterClrMapping/>
   </p:clrMapOvr>
+  <p:timing>
+    <p:tnLst>
+      <p:par>
+        <p:cTn id="1" dur="indefinite" restart="never" nodeType="tmRoot">
+          <p:childTnLst>
+            <p:seq>
+              <p:cTn id="2" nodeType="mainSeq"/>
+              <p:prevCondLst>
+                <p:cond evt="onPrev" delay="0">
+                  <p:tgtEl>
+                    <p:sldTgt/>
+                  </p:tgtEl>
+                </p:cond>
+              </p:prevCondLst>
+              <p:nextCondLst>
+                <p:cond evt="onNext" delay="0">
+                  <p:tgtEl>
+                    <p:sldTgt/>
+                  </p:tgtEl>
+                </p:cond>
+              </p:nextCondLst>
+            </p:seq>
+          </p:childTnLst>
+        </p:cTn>
+      </p:par>
+    </p:tnLst>
+  </p:timing>
 </p:sld>
 </file>
 
-<file path=ppt/slides/slide32.xml><?xml version="1.0" encoding="utf-8"?>
+<file path=ppt/slides/slide33.xml><?xml version="1.0" encoding="utf-8"?>
 <p:sld xmlns:a="http://schemas.openxmlformats.org/drawingml/2006/main" xmlns:r="http://schemas.openxmlformats.org/officeDocument/2006/relationships" xmlns:p="http://schemas.openxmlformats.org/presentationml/2006/main">
   <p:cSld>
     <p:spTree>
@@ -37698,7 +38618,7 @@
 </p:sld>
 </file>
 
-<file path=ppt/slides/slide33.xml><?xml version="1.0" encoding="utf-8"?>
+<file path=ppt/slides/slide34.xml><?xml version="1.0" encoding="utf-8"?>
 <p:sld xmlns:a="http://schemas.openxmlformats.org/drawingml/2006/main" xmlns:r="http://schemas.openxmlformats.org/officeDocument/2006/relationships" xmlns:p="http://schemas.openxmlformats.org/presentationml/2006/main">
   <p:cSld>
     <p:spTree>
@@ -37878,7 +38798,7 @@
         </p:nvSpPr>
         <p:spPr>
           <a:xfrm>
-            <a:off x="446522" y="225275"/>
+            <a:off x="446522" y="752814"/>
             <a:ext cx="6034992" cy="1325160"/>
           </a:xfrm>
           <a:prstGeom prst="rect">
@@ -37924,21 +38844,7 @@
                 </a:uFill>
                 <a:latin typeface="Calibri Light"/>
               </a:rPr>
-              <a:t>design </a:t>
-            </a:r>
-            <a:r>
-              <a:rPr lang="sv-SE" sz="4400" strike="noStrike" spc="-1" dirty="0" smtClean="0">
-                <a:solidFill>
-                  <a:srgbClr val="000000"/>
-                </a:solidFill>
-                <a:uFill>
-                  <a:solidFill>
-                    <a:srgbClr val="FFFFFF"/>
-                  </a:solidFill>
-                </a:uFill>
-                <a:latin typeface="Calibri Light"/>
-              </a:rPr>
-              <a:t>– detaljerad</a:t>
+              <a:t>design – detaljerad</a:t>
             </a:r>
           </a:p>
           <a:p>
@@ -39089,22 +39995,7 @@
                 <a:latin typeface="Calibri Light"/>
                 <a:ea typeface="DejaVu Sans"/>
               </a:rPr>
-              <a:t>Felix </a:t>
-            </a:r>
-            <a:r>
-              <a:rPr lang="sv-SE" sz="4400" b="0" strike="noStrike" spc="-1" dirty="0" smtClean="0">
-                <a:solidFill>
-                  <a:srgbClr val="000000"/>
-                </a:solidFill>
-                <a:uFill>
-                  <a:solidFill>
-                    <a:srgbClr val="FFFFFF"/>
-                  </a:solidFill>
-                </a:uFill>
-                <a:latin typeface="Calibri Light"/>
-                <a:ea typeface="DejaVu Sans"/>
-              </a:rPr>
-              <a:t>Törnqvist</a:t>
+              <a:t>Felix Törnqvist</a:t>
             </a:r>
             <a:endParaRPr lang="sv-SE" sz="1800" b="0" strike="noStrike" spc="-1" dirty="0">
               <a:solidFill>

</xml_diff>